<commit_message>
Update Circular Motion MindsOn.pptx
</commit_message>
<xml_diff>
--- a/Unit 2 Kinematics/L11 Circular Motion/Circular Motion MindsOn.pptx
+++ b/Unit 2 Kinematics/L11 Circular Motion/Circular Motion MindsOn.pptx
@@ -6,6 +6,7 @@
   </p:sldMasterIdLst>
   <p:sldIdLst>
     <p:sldId id="275" r:id="rId2"/>
+    <p:sldId id="276" r:id="rId3"/>
   </p:sldIdLst>
   <p:sldSz cx="9144000" cy="6858000" type="screen4x3"/>
   <p:notesSz cx="7023100" cy="9309100"/>
@@ -3569,6 +3570,1052 @@
 </p:sld>
 </file>
 
+<file path=ppt/slides/slide2.xml><?xml version="1.0" encoding="utf-8"?>
+<p:sld xmlns:a="http://schemas.openxmlformats.org/drawingml/2006/main" xmlns:r="http://schemas.openxmlformats.org/officeDocument/2006/relationships" xmlns:p="http://schemas.openxmlformats.org/presentationml/2006/main">
+  <p:cSld>
+    <p:spTree>
+      <p:nvGrpSpPr>
+        <p:cNvPr id="1" name=""/>
+        <p:cNvGrpSpPr/>
+        <p:nvPr/>
+      </p:nvGrpSpPr>
+      <p:grpSpPr>
+        <a:xfrm>
+          <a:off x="0" y="0"/>
+          <a:ext cx="0" cy="0"/>
+          <a:chOff x="0" y="0"/>
+          <a:chExt cx="0" cy="0"/>
+        </a:xfrm>
+      </p:grpSpPr>
+      <p:grpSp>
+        <p:nvGrpSpPr>
+          <p:cNvPr id="4" name="Group 3"/>
+          <p:cNvGrpSpPr/>
+          <p:nvPr/>
+        </p:nvGrpSpPr>
+        <p:grpSpPr>
+          <a:xfrm>
+            <a:off x="1447800" y="1524000"/>
+            <a:ext cx="1524000" cy="1534012"/>
+            <a:chOff x="3200400" y="2808107"/>
+            <a:chExt cx="2120783" cy="2110362"/>
+          </a:xfrm>
+        </p:grpSpPr>
+        <p:sp>
+          <p:nvSpPr>
+            <p:cNvPr id="5" name="Rectangle 4"/>
+            <p:cNvSpPr/>
+            <p:nvPr/>
+          </p:nvSpPr>
+          <p:spPr>
+            <a:xfrm>
+              <a:off x="4101983" y="3505200"/>
+              <a:ext cx="241417" cy="194069"/>
+            </a:xfrm>
+            <a:prstGeom prst="rect">
+              <a:avLst/>
+            </a:prstGeom>
+            <a:noFill/>
+            <a:ln w="12700">
+              <a:solidFill>
+                <a:schemeClr val="tx1"/>
+              </a:solidFill>
+              <a:prstDash val="dash"/>
+            </a:ln>
+          </p:spPr>
+          <p:style>
+            <a:lnRef idx="2">
+              <a:schemeClr val="accent1">
+                <a:shade val="50000"/>
+              </a:schemeClr>
+            </a:lnRef>
+            <a:fillRef idx="1">
+              <a:schemeClr val="accent1"/>
+            </a:fillRef>
+            <a:effectRef idx="0">
+              <a:schemeClr val="accent1"/>
+            </a:effectRef>
+            <a:fontRef idx="minor">
+              <a:schemeClr val="lt1"/>
+            </a:fontRef>
+          </p:style>
+          <p:txBody>
+            <a:bodyPr rtlCol="0" anchor="ctr"/>
+            <a:lstStyle/>
+            <a:p>
+              <a:pPr algn="ctr"/>
+              <a:endParaRPr lang="en-US"/>
+            </a:p>
+          </p:txBody>
+        </p:sp>
+        <p:sp>
+          <p:nvSpPr>
+            <p:cNvPr id="6" name="Oval 5"/>
+            <p:cNvSpPr/>
+            <p:nvPr/>
+          </p:nvSpPr>
+          <p:spPr>
+            <a:xfrm>
+              <a:off x="3200400" y="2819400"/>
+              <a:ext cx="1803167" cy="1759739"/>
+            </a:xfrm>
+            <a:prstGeom prst="ellipse">
+              <a:avLst/>
+            </a:prstGeom>
+            <a:noFill/>
+            <a:ln>
+              <a:solidFill>
+                <a:schemeClr val="tx1"/>
+              </a:solidFill>
+            </a:ln>
+          </p:spPr>
+          <p:style>
+            <a:lnRef idx="2">
+              <a:schemeClr val="accent1">
+                <a:shade val="50000"/>
+              </a:schemeClr>
+            </a:lnRef>
+            <a:fillRef idx="1">
+              <a:schemeClr val="accent1"/>
+            </a:fillRef>
+            <a:effectRef idx="0">
+              <a:schemeClr val="accent1"/>
+            </a:effectRef>
+            <a:fontRef idx="minor">
+              <a:schemeClr val="lt1"/>
+            </a:fontRef>
+          </p:style>
+          <p:txBody>
+            <a:bodyPr rtlCol="0" anchor="ctr"/>
+            <a:lstStyle/>
+            <a:p>
+              <a:pPr algn="ctr"/>
+              <a:endParaRPr lang="en-US"/>
+            </a:p>
+          </p:txBody>
+        </p:sp>
+        <p:cxnSp>
+          <p:nvCxnSpPr>
+            <p:cNvPr id="7" name="Straight Arrow Connector 6"/>
+            <p:cNvCxnSpPr/>
+            <p:nvPr/>
+          </p:nvCxnSpPr>
+          <p:spPr>
+            <a:xfrm>
+              <a:off x="4101983" y="2808107"/>
+              <a:ext cx="1219200" cy="0"/>
+            </a:xfrm>
+            <a:prstGeom prst="straightConnector1">
+              <a:avLst/>
+            </a:prstGeom>
+            <a:ln w="38100">
+              <a:solidFill>
+                <a:srgbClr val="FF0000"/>
+              </a:solidFill>
+              <a:tailEnd type="arrow"/>
+            </a:ln>
+          </p:spPr>
+          <p:style>
+            <a:lnRef idx="1">
+              <a:schemeClr val="accent1"/>
+            </a:lnRef>
+            <a:fillRef idx="0">
+              <a:schemeClr val="accent1"/>
+            </a:fillRef>
+            <a:effectRef idx="0">
+              <a:schemeClr val="accent1"/>
+            </a:effectRef>
+            <a:fontRef idx="minor">
+              <a:schemeClr val="tx1"/>
+            </a:fontRef>
+          </p:style>
+        </p:cxnSp>
+        <p:cxnSp>
+          <p:nvCxnSpPr>
+            <p:cNvPr id="8" name="Straight Arrow Connector 7"/>
+            <p:cNvCxnSpPr/>
+            <p:nvPr/>
+          </p:nvCxnSpPr>
+          <p:spPr>
+            <a:xfrm>
+              <a:off x="5015670" y="3699269"/>
+              <a:ext cx="0" cy="1219200"/>
+            </a:xfrm>
+            <a:prstGeom prst="straightConnector1">
+              <a:avLst/>
+            </a:prstGeom>
+            <a:ln w="38100">
+              <a:solidFill>
+                <a:srgbClr val="FF0000"/>
+              </a:solidFill>
+              <a:tailEnd type="arrow"/>
+            </a:ln>
+          </p:spPr>
+          <p:style>
+            <a:lnRef idx="1">
+              <a:schemeClr val="accent1"/>
+            </a:lnRef>
+            <a:fillRef idx="0">
+              <a:schemeClr val="accent1"/>
+            </a:fillRef>
+            <a:effectRef idx="0">
+              <a:schemeClr val="accent1"/>
+            </a:effectRef>
+            <a:fontRef idx="minor">
+              <a:schemeClr val="tx1"/>
+            </a:fontRef>
+          </p:style>
+        </p:cxnSp>
+        <p:cxnSp>
+          <p:nvCxnSpPr>
+            <p:cNvPr id="11" name="Straight Connector 10"/>
+            <p:cNvCxnSpPr>
+              <a:stCxn id="6" idx="0"/>
+            </p:cNvCxnSpPr>
+            <p:nvPr/>
+          </p:nvCxnSpPr>
+          <p:spPr>
+            <a:xfrm flipH="1">
+              <a:off x="4101983" y="2819400"/>
+              <a:ext cx="1" cy="879869"/>
+            </a:xfrm>
+            <a:prstGeom prst="line">
+              <a:avLst/>
+            </a:prstGeom>
+            <a:ln w="12700">
+              <a:solidFill>
+                <a:schemeClr val="tx1"/>
+              </a:solidFill>
+              <a:prstDash val="dash"/>
+            </a:ln>
+          </p:spPr>
+          <p:style>
+            <a:lnRef idx="1">
+              <a:schemeClr val="accent1"/>
+            </a:lnRef>
+            <a:fillRef idx="0">
+              <a:schemeClr val="accent1"/>
+            </a:fillRef>
+            <a:effectRef idx="0">
+              <a:schemeClr val="accent1"/>
+            </a:effectRef>
+            <a:fontRef idx="minor">
+              <a:schemeClr val="tx1"/>
+            </a:fontRef>
+          </p:style>
+        </p:cxnSp>
+        <p:cxnSp>
+          <p:nvCxnSpPr>
+            <p:cNvPr id="12" name="Straight Connector 11"/>
+            <p:cNvCxnSpPr/>
+            <p:nvPr/>
+          </p:nvCxnSpPr>
+          <p:spPr>
+            <a:xfrm>
+              <a:off x="4190653" y="3704726"/>
+              <a:ext cx="862785" cy="0"/>
+            </a:xfrm>
+            <a:prstGeom prst="line">
+              <a:avLst/>
+            </a:prstGeom>
+            <a:ln w="12700">
+              <a:solidFill>
+                <a:schemeClr val="tx1"/>
+              </a:solidFill>
+              <a:prstDash val="dash"/>
+            </a:ln>
+          </p:spPr>
+          <p:style>
+            <a:lnRef idx="1">
+              <a:schemeClr val="accent1"/>
+            </a:lnRef>
+            <a:fillRef idx="0">
+              <a:schemeClr val="accent1"/>
+            </a:fillRef>
+            <a:effectRef idx="0">
+              <a:schemeClr val="accent1"/>
+            </a:effectRef>
+            <a:fontRef idx="minor">
+              <a:schemeClr val="tx1"/>
+            </a:fontRef>
+          </p:style>
+        </p:cxnSp>
+      </p:grpSp>
+      <p:grpSp>
+        <p:nvGrpSpPr>
+          <p:cNvPr id="27" name="Group 26"/>
+          <p:cNvGrpSpPr/>
+          <p:nvPr/>
+        </p:nvGrpSpPr>
+        <p:grpSpPr>
+          <a:xfrm rot="5400000">
+            <a:off x="5029200" y="1524000"/>
+            <a:ext cx="1524000" cy="1534012"/>
+            <a:chOff x="3200400" y="2808107"/>
+            <a:chExt cx="2120783" cy="2110362"/>
+          </a:xfrm>
+        </p:grpSpPr>
+        <p:sp>
+          <p:nvSpPr>
+            <p:cNvPr id="28" name="Rectangle 27"/>
+            <p:cNvSpPr/>
+            <p:nvPr/>
+          </p:nvSpPr>
+          <p:spPr>
+            <a:xfrm>
+              <a:off x="4101983" y="3505200"/>
+              <a:ext cx="241417" cy="194069"/>
+            </a:xfrm>
+            <a:prstGeom prst="rect">
+              <a:avLst/>
+            </a:prstGeom>
+            <a:noFill/>
+            <a:ln w="12700">
+              <a:solidFill>
+                <a:schemeClr val="tx1"/>
+              </a:solidFill>
+              <a:prstDash val="dash"/>
+            </a:ln>
+          </p:spPr>
+          <p:style>
+            <a:lnRef idx="2">
+              <a:schemeClr val="accent1">
+                <a:shade val="50000"/>
+              </a:schemeClr>
+            </a:lnRef>
+            <a:fillRef idx="1">
+              <a:schemeClr val="accent1"/>
+            </a:fillRef>
+            <a:effectRef idx="0">
+              <a:schemeClr val="accent1"/>
+            </a:effectRef>
+            <a:fontRef idx="minor">
+              <a:schemeClr val="lt1"/>
+            </a:fontRef>
+          </p:style>
+          <p:txBody>
+            <a:bodyPr rtlCol="0" anchor="ctr"/>
+            <a:lstStyle/>
+            <a:p>
+              <a:pPr algn="ctr"/>
+              <a:endParaRPr lang="en-US"/>
+            </a:p>
+          </p:txBody>
+        </p:sp>
+        <p:sp>
+          <p:nvSpPr>
+            <p:cNvPr id="29" name="Oval 28"/>
+            <p:cNvSpPr/>
+            <p:nvPr/>
+          </p:nvSpPr>
+          <p:spPr>
+            <a:xfrm>
+              <a:off x="3200400" y="2819400"/>
+              <a:ext cx="1803167" cy="1759739"/>
+            </a:xfrm>
+            <a:prstGeom prst="ellipse">
+              <a:avLst/>
+            </a:prstGeom>
+            <a:noFill/>
+            <a:ln>
+              <a:solidFill>
+                <a:schemeClr val="tx1"/>
+              </a:solidFill>
+            </a:ln>
+          </p:spPr>
+          <p:style>
+            <a:lnRef idx="2">
+              <a:schemeClr val="accent1">
+                <a:shade val="50000"/>
+              </a:schemeClr>
+            </a:lnRef>
+            <a:fillRef idx="1">
+              <a:schemeClr val="accent1"/>
+            </a:fillRef>
+            <a:effectRef idx="0">
+              <a:schemeClr val="accent1"/>
+            </a:effectRef>
+            <a:fontRef idx="minor">
+              <a:schemeClr val="lt1"/>
+            </a:fontRef>
+          </p:style>
+          <p:txBody>
+            <a:bodyPr rtlCol="0" anchor="ctr"/>
+            <a:lstStyle/>
+            <a:p>
+              <a:pPr algn="ctr"/>
+              <a:endParaRPr lang="en-US"/>
+            </a:p>
+          </p:txBody>
+        </p:sp>
+        <p:cxnSp>
+          <p:nvCxnSpPr>
+            <p:cNvPr id="30" name="Straight Arrow Connector 29"/>
+            <p:cNvCxnSpPr/>
+            <p:nvPr/>
+          </p:nvCxnSpPr>
+          <p:spPr>
+            <a:xfrm>
+              <a:off x="4101983" y="2808107"/>
+              <a:ext cx="1219200" cy="0"/>
+            </a:xfrm>
+            <a:prstGeom prst="straightConnector1">
+              <a:avLst/>
+            </a:prstGeom>
+            <a:ln w="38100">
+              <a:solidFill>
+                <a:srgbClr val="FF0000"/>
+              </a:solidFill>
+              <a:tailEnd type="arrow"/>
+            </a:ln>
+          </p:spPr>
+          <p:style>
+            <a:lnRef idx="1">
+              <a:schemeClr val="accent1"/>
+            </a:lnRef>
+            <a:fillRef idx="0">
+              <a:schemeClr val="accent1"/>
+            </a:fillRef>
+            <a:effectRef idx="0">
+              <a:schemeClr val="accent1"/>
+            </a:effectRef>
+            <a:fontRef idx="minor">
+              <a:schemeClr val="tx1"/>
+            </a:fontRef>
+          </p:style>
+        </p:cxnSp>
+        <p:cxnSp>
+          <p:nvCxnSpPr>
+            <p:cNvPr id="31" name="Straight Arrow Connector 30"/>
+            <p:cNvCxnSpPr/>
+            <p:nvPr/>
+          </p:nvCxnSpPr>
+          <p:spPr>
+            <a:xfrm>
+              <a:off x="5015670" y="3699269"/>
+              <a:ext cx="0" cy="1219200"/>
+            </a:xfrm>
+            <a:prstGeom prst="straightConnector1">
+              <a:avLst/>
+            </a:prstGeom>
+            <a:ln w="38100">
+              <a:solidFill>
+                <a:srgbClr val="FF0000"/>
+              </a:solidFill>
+              <a:tailEnd type="arrow"/>
+            </a:ln>
+          </p:spPr>
+          <p:style>
+            <a:lnRef idx="1">
+              <a:schemeClr val="accent1"/>
+            </a:lnRef>
+            <a:fillRef idx="0">
+              <a:schemeClr val="accent1"/>
+            </a:fillRef>
+            <a:effectRef idx="0">
+              <a:schemeClr val="accent1"/>
+            </a:effectRef>
+            <a:fontRef idx="minor">
+              <a:schemeClr val="tx1"/>
+            </a:fontRef>
+          </p:style>
+        </p:cxnSp>
+        <p:cxnSp>
+          <p:nvCxnSpPr>
+            <p:cNvPr id="32" name="Straight Connector 31"/>
+            <p:cNvCxnSpPr>
+              <a:stCxn id="29" idx="0"/>
+            </p:cNvCxnSpPr>
+            <p:nvPr/>
+          </p:nvCxnSpPr>
+          <p:spPr>
+            <a:xfrm flipH="1">
+              <a:off x="4101983" y="2819400"/>
+              <a:ext cx="1" cy="879869"/>
+            </a:xfrm>
+            <a:prstGeom prst="line">
+              <a:avLst/>
+            </a:prstGeom>
+            <a:ln w="12700">
+              <a:solidFill>
+                <a:schemeClr val="tx1"/>
+              </a:solidFill>
+              <a:prstDash val="dash"/>
+            </a:ln>
+          </p:spPr>
+          <p:style>
+            <a:lnRef idx="1">
+              <a:schemeClr val="accent1"/>
+            </a:lnRef>
+            <a:fillRef idx="0">
+              <a:schemeClr val="accent1"/>
+            </a:fillRef>
+            <a:effectRef idx="0">
+              <a:schemeClr val="accent1"/>
+            </a:effectRef>
+            <a:fontRef idx="minor">
+              <a:schemeClr val="tx1"/>
+            </a:fontRef>
+          </p:style>
+        </p:cxnSp>
+        <p:cxnSp>
+          <p:nvCxnSpPr>
+            <p:cNvPr id="33" name="Straight Connector 32"/>
+            <p:cNvCxnSpPr/>
+            <p:nvPr/>
+          </p:nvCxnSpPr>
+          <p:spPr>
+            <a:xfrm>
+              <a:off x="4190653" y="3704726"/>
+              <a:ext cx="862785" cy="0"/>
+            </a:xfrm>
+            <a:prstGeom prst="line">
+              <a:avLst/>
+            </a:prstGeom>
+            <a:ln w="12700">
+              <a:solidFill>
+                <a:schemeClr val="tx1"/>
+              </a:solidFill>
+              <a:prstDash val="dash"/>
+            </a:ln>
+          </p:spPr>
+          <p:style>
+            <a:lnRef idx="1">
+              <a:schemeClr val="accent1"/>
+            </a:lnRef>
+            <a:fillRef idx="0">
+              <a:schemeClr val="accent1"/>
+            </a:fillRef>
+            <a:effectRef idx="0">
+              <a:schemeClr val="accent1"/>
+            </a:effectRef>
+            <a:fontRef idx="minor">
+              <a:schemeClr val="tx1"/>
+            </a:fontRef>
+          </p:style>
+        </p:cxnSp>
+      </p:grpSp>
+      <p:grpSp>
+        <p:nvGrpSpPr>
+          <p:cNvPr id="34" name="Group 33"/>
+          <p:cNvGrpSpPr/>
+          <p:nvPr/>
+        </p:nvGrpSpPr>
+        <p:grpSpPr>
+          <a:xfrm rot="10800000">
+            <a:off x="1333680" y="4267200"/>
+            <a:ext cx="1524000" cy="1534012"/>
+            <a:chOff x="3200400" y="2808107"/>
+            <a:chExt cx="2120783" cy="2110362"/>
+          </a:xfrm>
+        </p:grpSpPr>
+        <p:sp>
+          <p:nvSpPr>
+            <p:cNvPr id="35" name="Rectangle 34"/>
+            <p:cNvSpPr/>
+            <p:nvPr/>
+          </p:nvSpPr>
+          <p:spPr>
+            <a:xfrm>
+              <a:off x="4101983" y="3505200"/>
+              <a:ext cx="241417" cy="194069"/>
+            </a:xfrm>
+            <a:prstGeom prst="rect">
+              <a:avLst/>
+            </a:prstGeom>
+            <a:noFill/>
+            <a:ln w="12700">
+              <a:solidFill>
+                <a:schemeClr val="tx1"/>
+              </a:solidFill>
+              <a:prstDash val="dash"/>
+            </a:ln>
+          </p:spPr>
+          <p:style>
+            <a:lnRef idx="2">
+              <a:schemeClr val="accent1">
+                <a:shade val="50000"/>
+              </a:schemeClr>
+            </a:lnRef>
+            <a:fillRef idx="1">
+              <a:schemeClr val="accent1"/>
+            </a:fillRef>
+            <a:effectRef idx="0">
+              <a:schemeClr val="accent1"/>
+            </a:effectRef>
+            <a:fontRef idx="minor">
+              <a:schemeClr val="lt1"/>
+            </a:fontRef>
+          </p:style>
+          <p:txBody>
+            <a:bodyPr rtlCol="0" anchor="ctr"/>
+            <a:lstStyle/>
+            <a:p>
+              <a:pPr algn="ctr"/>
+              <a:endParaRPr lang="en-US"/>
+            </a:p>
+          </p:txBody>
+        </p:sp>
+        <p:sp>
+          <p:nvSpPr>
+            <p:cNvPr id="36" name="Oval 35"/>
+            <p:cNvSpPr/>
+            <p:nvPr/>
+          </p:nvSpPr>
+          <p:spPr>
+            <a:xfrm>
+              <a:off x="3200400" y="2819400"/>
+              <a:ext cx="1803167" cy="1759739"/>
+            </a:xfrm>
+            <a:prstGeom prst="ellipse">
+              <a:avLst/>
+            </a:prstGeom>
+            <a:noFill/>
+            <a:ln>
+              <a:solidFill>
+                <a:schemeClr val="tx1"/>
+              </a:solidFill>
+            </a:ln>
+          </p:spPr>
+          <p:style>
+            <a:lnRef idx="2">
+              <a:schemeClr val="accent1">
+                <a:shade val="50000"/>
+              </a:schemeClr>
+            </a:lnRef>
+            <a:fillRef idx="1">
+              <a:schemeClr val="accent1"/>
+            </a:fillRef>
+            <a:effectRef idx="0">
+              <a:schemeClr val="accent1"/>
+            </a:effectRef>
+            <a:fontRef idx="minor">
+              <a:schemeClr val="lt1"/>
+            </a:fontRef>
+          </p:style>
+          <p:txBody>
+            <a:bodyPr rtlCol="0" anchor="ctr"/>
+            <a:lstStyle/>
+            <a:p>
+              <a:pPr algn="ctr"/>
+              <a:endParaRPr lang="en-US"/>
+            </a:p>
+          </p:txBody>
+        </p:sp>
+        <p:cxnSp>
+          <p:nvCxnSpPr>
+            <p:cNvPr id="37" name="Straight Arrow Connector 36"/>
+            <p:cNvCxnSpPr/>
+            <p:nvPr/>
+          </p:nvCxnSpPr>
+          <p:spPr>
+            <a:xfrm>
+              <a:off x="4101983" y="2808107"/>
+              <a:ext cx="1219200" cy="0"/>
+            </a:xfrm>
+            <a:prstGeom prst="straightConnector1">
+              <a:avLst/>
+            </a:prstGeom>
+            <a:ln w="38100">
+              <a:solidFill>
+                <a:srgbClr val="FF0000"/>
+              </a:solidFill>
+              <a:tailEnd type="arrow"/>
+            </a:ln>
+          </p:spPr>
+          <p:style>
+            <a:lnRef idx="1">
+              <a:schemeClr val="accent1"/>
+            </a:lnRef>
+            <a:fillRef idx="0">
+              <a:schemeClr val="accent1"/>
+            </a:fillRef>
+            <a:effectRef idx="0">
+              <a:schemeClr val="accent1"/>
+            </a:effectRef>
+            <a:fontRef idx="minor">
+              <a:schemeClr val="tx1"/>
+            </a:fontRef>
+          </p:style>
+        </p:cxnSp>
+        <p:cxnSp>
+          <p:nvCxnSpPr>
+            <p:cNvPr id="38" name="Straight Arrow Connector 37"/>
+            <p:cNvCxnSpPr/>
+            <p:nvPr/>
+          </p:nvCxnSpPr>
+          <p:spPr>
+            <a:xfrm>
+              <a:off x="5015670" y="3699269"/>
+              <a:ext cx="0" cy="1219200"/>
+            </a:xfrm>
+            <a:prstGeom prst="straightConnector1">
+              <a:avLst/>
+            </a:prstGeom>
+            <a:ln w="38100">
+              <a:solidFill>
+                <a:srgbClr val="FF0000"/>
+              </a:solidFill>
+              <a:tailEnd type="arrow"/>
+            </a:ln>
+          </p:spPr>
+          <p:style>
+            <a:lnRef idx="1">
+              <a:schemeClr val="accent1"/>
+            </a:lnRef>
+            <a:fillRef idx="0">
+              <a:schemeClr val="accent1"/>
+            </a:fillRef>
+            <a:effectRef idx="0">
+              <a:schemeClr val="accent1"/>
+            </a:effectRef>
+            <a:fontRef idx="minor">
+              <a:schemeClr val="tx1"/>
+            </a:fontRef>
+          </p:style>
+        </p:cxnSp>
+        <p:cxnSp>
+          <p:nvCxnSpPr>
+            <p:cNvPr id="39" name="Straight Connector 38"/>
+            <p:cNvCxnSpPr>
+              <a:stCxn id="36" idx="0"/>
+            </p:cNvCxnSpPr>
+            <p:nvPr/>
+          </p:nvCxnSpPr>
+          <p:spPr>
+            <a:xfrm flipH="1">
+              <a:off x="4101983" y="2819400"/>
+              <a:ext cx="1" cy="879869"/>
+            </a:xfrm>
+            <a:prstGeom prst="line">
+              <a:avLst/>
+            </a:prstGeom>
+            <a:ln w="12700">
+              <a:solidFill>
+                <a:schemeClr val="tx1"/>
+              </a:solidFill>
+              <a:prstDash val="dash"/>
+            </a:ln>
+          </p:spPr>
+          <p:style>
+            <a:lnRef idx="1">
+              <a:schemeClr val="accent1"/>
+            </a:lnRef>
+            <a:fillRef idx="0">
+              <a:schemeClr val="accent1"/>
+            </a:fillRef>
+            <a:effectRef idx="0">
+              <a:schemeClr val="accent1"/>
+            </a:effectRef>
+            <a:fontRef idx="minor">
+              <a:schemeClr val="tx1"/>
+            </a:fontRef>
+          </p:style>
+        </p:cxnSp>
+        <p:cxnSp>
+          <p:nvCxnSpPr>
+            <p:cNvPr id="40" name="Straight Connector 39"/>
+            <p:cNvCxnSpPr/>
+            <p:nvPr/>
+          </p:nvCxnSpPr>
+          <p:spPr>
+            <a:xfrm>
+              <a:off x="4190653" y="3704726"/>
+              <a:ext cx="862785" cy="0"/>
+            </a:xfrm>
+            <a:prstGeom prst="line">
+              <a:avLst/>
+            </a:prstGeom>
+            <a:ln w="12700">
+              <a:solidFill>
+                <a:schemeClr val="tx1"/>
+              </a:solidFill>
+              <a:prstDash val="dash"/>
+            </a:ln>
+          </p:spPr>
+          <p:style>
+            <a:lnRef idx="1">
+              <a:schemeClr val="accent1"/>
+            </a:lnRef>
+            <a:fillRef idx="0">
+              <a:schemeClr val="accent1"/>
+            </a:fillRef>
+            <a:effectRef idx="0">
+              <a:schemeClr val="accent1"/>
+            </a:effectRef>
+            <a:fontRef idx="minor">
+              <a:schemeClr val="tx1"/>
+            </a:fontRef>
+          </p:style>
+        </p:cxnSp>
+      </p:grpSp>
+      <p:grpSp>
+        <p:nvGrpSpPr>
+          <p:cNvPr id="41" name="Group 40"/>
+          <p:cNvGrpSpPr/>
+          <p:nvPr/>
+        </p:nvGrpSpPr>
+        <p:grpSpPr>
+          <a:xfrm rot="16200000">
+            <a:off x="5218958" y="4272206"/>
+            <a:ext cx="1524000" cy="1534012"/>
+            <a:chOff x="3200400" y="2808107"/>
+            <a:chExt cx="2120783" cy="2110362"/>
+          </a:xfrm>
+        </p:grpSpPr>
+        <p:sp>
+          <p:nvSpPr>
+            <p:cNvPr id="42" name="Rectangle 41"/>
+            <p:cNvSpPr/>
+            <p:nvPr/>
+          </p:nvSpPr>
+          <p:spPr>
+            <a:xfrm>
+              <a:off x="4101983" y="3505200"/>
+              <a:ext cx="241417" cy="194069"/>
+            </a:xfrm>
+            <a:prstGeom prst="rect">
+              <a:avLst/>
+            </a:prstGeom>
+            <a:noFill/>
+            <a:ln w="12700">
+              <a:solidFill>
+                <a:schemeClr val="tx1"/>
+              </a:solidFill>
+              <a:prstDash val="dash"/>
+            </a:ln>
+          </p:spPr>
+          <p:style>
+            <a:lnRef idx="2">
+              <a:schemeClr val="accent1">
+                <a:shade val="50000"/>
+              </a:schemeClr>
+            </a:lnRef>
+            <a:fillRef idx="1">
+              <a:schemeClr val="accent1"/>
+            </a:fillRef>
+            <a:effectRef idx="0">
+              <a:schemeClr val="accent1"/>
+            </a:effectRef>
+            <a:fontRef idx="minor">
+              <a:schemeClr val="lt1"/>
+            </a:fontRef>
+          </p:style>
+          <p:txBody>
+            <a:bodyPr rtlCol="0" anchor="ctr"/>
+            <a:lstStyle/>
+            <a:p>
+              <a:pPr algn="ctr"/>
+              <a:endParaRPr lang="en-US"/>
+            </a:p>
+          </p:txBody>
+        </p:sp>
+        <p:sp>
+          <p:nvSpPr>
+            <p:cNvPr id="43" name="Oval 42"/>
+            <p:cNvSpPr/>
+            <p:nvPr/>
+          </p:nvSpPr>
+          <p:spPr>
+            <a:xfrm>
+              <a:off x="3200400" y="2819400"/>
+              <a:ext cx="1803167" cy="1759739"/>
+            </a:xfrm>
+            <a:prstGeom prst="ellipse">
+              <a:avLst/>
+            </a:prstGeom>
+            <a:noFill/>
+            <a:ln>
+              <a:solidFill>
+                <a:schemeClr val="tx1"/>
+              </a:solidFill>
+            </a:ln>
+          </p:spPr>
+          <p:style>
+            <a:lnRef idx="2">
+              <a:schemeClr val="accent1">
+                <a:shade val="50000"/>
+              </a:schemeClr>
+            </a:lnRef>
+            <a:fillRef idx="1">
+              <a:schemeClr val="accent1"/>
+            </a:fillRef>
+            <a:effectRef idx="0">
+              <a:schemeClr val="accent1"/>
+            </a:effectRef>
+            <a:fontRef idx="minor">
+              <a:schemeClr val="lt1"/>
+            </a:fontRef>
+          </p:style>
+          <p:txBody>
+            <a:bodyPr rtlCol="0" anchor="ctr"/>
+            <a:lstStyle/>
+            <a:p>
+              <a:pPr algn="ctr"/>
+              <a:endParaRPr lang="en-US"/>
+            </a:p>
+          </p:txBody>
+        </p:sp>
+        <p:cxnSp>
+          <p:nvCxnSpPr>
+            <p:cNvPr id="44" name="Straight Arrow Connector 43"/>
+            <p:cNvCxnSpPr/>
+            <p:nvPr/>
+          </p:nvCxnSpPr>
+          <p:spPr>
+            <a:xfrm>
+              <a:off x="4101983" y="2808107"/>
+              <a:ext cx="1219200" cy="0"/>
+            </a:xfrm>
+            <a:prstGeom prst="straightConnector1">
+              <a:avLst/>
+            </a:prstGeom>
+            <a:ln w="38100">
+              <a:solidFill>
+                <a:srgbClr val="FF0000"/>
+              </a:solidFill>
+              <a:tailEnd type="arrow"/>
+            </a:ln>
+          </p:spPr>
+          <p:style>
+            <a:lnRef idx="1">
+              <a:schemeClr val="accent1"/>
+            </a:lnRef>
+            <a:fillRef idx="0">
+              <a:schemeClr val="accent1"/>
+            </a:fillRef>
+            <a:effectRef idx="0">
+              <a:schemeClr val="accent1"/>
+            </a:effectRef>
+            <a:fontRef idx="minor">
+              <a:schemeClr val="tx1"/>
+            </a:fontRef>
+          </p:style>
+        </p:cxnSp>
+        <p:cxnSp>
+          <p:nvCxnSpPr>
+            <p:cNvPr id="45" name="Straight Arrow Connector 44"/>
+            <p:cNvCxnSpPr/>
+            <p:nvPr/>
+          </p:nvCxnSpPr>
+          <p:spPr>
+            <a:xfrm>
+              <a:off x="5015670" y="3699269"/>
+              <a:ext cx="0" cy="1219200"/>
+            </a:xfrm>
+            <a:prstGeom prst="straightConnector1">
+              <a:avLst/>
+            </a:prstGeom>
+            <a:ln w="38100">
+              <a:solidFill>
+                <a:srgbClr val="FF0000"/>
+              </a:solidFill>
+              <a:tailEnd type="arrow"/>
+            </a:ln>
+          </p:spPr>
+          <p:style>
+            <a:lnRef idx="1">
+              <a:schemeClr val="accent1"/>
+            </a:lnRef>
+            <a:fillRef idx="0">
+              <a:schemeClr val="accent1"/>
+            </a:fillRef>
+            <a:effectRef idx="0">
+              <a:schemeClr val="accent1"/>
+            </a:effectRef>
+            <a:fontRef idx="minor">
+              <a:schemeClr val="tx1"/>
+            </a:fontRef>
+          </p:style>
+        </p:cxnSp>
+        <p:cxnSp>
+          <p:nvCxnSpPr>
+            <p:cNvPr id="46" name="Straight Connector 45"/>
+            <p:cNvCxnSpPr>
+              <a:stCxn id="43" idx="0"/>
+            </p:cNvCxnSpPr>
+            <p:nvPr/>
+          </p:nvCxnSpPr>
+          <p:spPr>
+            <a:xfrm flipH="1">
+              <a:off x="4101983" y="2819400"/>
+              <a:ext cx="1" cy="879869"/>
+            </a:xfrm>
+            <a:prstGeom prst="line">
+              <a:avLst/>
+            </a:prstGeom>
+            <a:ln w="12700">
+              <a:solidFill>
+                <a:schemeClr val="tx1"/>
+              </a:solidFill>
+              <a:prstDash val="dash"/>
+            </a:ln>
+          </p:spPr>
+          <p:style>
+            <a:lnRef idx="1">
+              <a:schemeClr val="accent1"/>
+            </a:lnRef>
+            <a:fillRef idx="0">
+              <a:schemeClr val="accent1"/>
+            </a:fillRef>
+            <a:effectRef idx="0">
+              <a:schemeClr val="accent1"/>
+            </a:effectRef>
+            <a:fontRef idx="minor">
+              <a:schemeClr val="tx1"/>
+            </a:fontRef>
+          </p:style>
+        </p:cxnSp>
+        <p:cxnSp>
+          <p:nvCxnSpPr>
+            <p:cNvPr id="47" name="Straight Connector 46"/>
+            <p:cNvCxnSpPr/>
+            <p:nvPr/>
+          </p:nvCxnSpPr>
+          <p:spPr>
+            <a:xfrm>
+              <a:off x="4190653" y="3704726"/>
+              <a:ext cx="862785" cy="0"/>
+            </a:xfrm>
+            <a:prstGeom prst="line">
+              <a:avLst/>
+            </a:prstGeom>
+            <a:ln w="12700">
+              <a:solidFill>
+                <a:schemeClr val="tx1"/>
+              </a:solidFill>
+              <a:prstDash val="dash"/>
+            </a:ln>
+          </p:spPr>
+          <p:style>
+            <a:lnRef idx="1">
+              <a:schemeClr val="accent1"/>
+            </a:lnRef>
+            <a:fillRef idx="0">
+              <a:schemeClr val="accent1"/>
+            </a:fillRef>
+            <a:effectRef idx="0">
+              <a:schemeClr val="accent1"/>
+            </a:effectRef>
+            <a:fontRef idx="minor">
+              <a:schemeClr val="tx1"/>
+            </a:fontRef>
+          </p:style>
+        </p:cxnSp>
+      </p:grpSp>
+    </p:spTree>
+    <p:extLst>
+      <p:ext uri="{BB962C8B-B14F-4D97-AF65-F5344CB8AC3E}">
+        <p14:creationId xmlns:p14="http://schemas.microsoft.com/office/powerpoint/2010/main" val="2051513462"/>
+      </p:ext>
+    </p:extLst>
+  </p:cSld>
+  <p:clrMapOvr>
+    <a:masterClrMapping/>
+  </p:clrMapOvr>
+</p:sld>
+</file>
+
 <file path=ppt/theme/theme1.xml><?xml version="1.0" encoding="utf-8"?>
 <a:theme xmlns:a="http://schemas.openxmlformats.org/drawingml/2006/main" name="Office Theme">
   <a:themeElements>

</xml_diff>